<commit_message>
Added command line tutorial files and updated appropriate presentations
</commit_message>
<xml_diff>
--- a/Presentations/D1-2-IntroCommandLine.pptx
+++ b/Presentations/D1-2-IntroCommandLine.pptx
@@ -884,15 +884,7 @@
           <a:p>
             <a:r>
               <a:rPr lang="en-US" dirty="0" smtClean="0"/>
-              <a:t>Sort –n </a:t>
-            </a:r>
-            <a:r>
-              <a:rPr lang="en-US" dirty="0" smtClean="0"/>
-              <a:t>randomNumbers1to10000_2.txt</a:t>
-            </a:r>
-            <a:r>
-              <a:rPr lang="en-US" dirty="0" smtClean="0"/>
-              <a:t> | head -200 | tail -1 &gt; randomNumbers1to10000_2_numericSort_200line.txt</a:t>
+              <a:t>Sort –n randomNumbers1to10000_2.txt | head -200 | tail -1 &gt; randomNumbers1to10000_2_numericSort_200line.txt</a:t>
             </a:r>
           </a:p>
           <a:p>
@@ -915,11 +907,7 @@
             </a:pPr>
             <a:r>
               <a:rPr lang="en-US" dirty="0" smtClean="0"/>
-              <a:t>Sort </a:t>
-            </a:r>
-            <a:r>
-              <a:rPr lang="en-US" dirty="0" smtClean="0"/>
-              <a:t>randomNumbers1to10000_2.txt | head -20000 | tail -1 &gt;  randomNumbers1to10000_2_alphaSort_20000line.txt</a:t>
+              <a:t>Sort randomNumbers1to10000_2.txt | head -20000 | tail -1 &gt;  randomNumbers1to10000_2_alphaSort_20000line.txt</a:t>
             </a:r>
           </a:p>
           <a:p>
@@ -6840,14 +6828,16 @@
           <a:lstStyle/>
           <a:p>
             <a:r>
-              <a:rPr lang="en-US" dirty="0" smtClean="0"/>
-              <a:t>Go to </a:t>
+              <a:rPr lang="en-US" smtClean="0">
+                <a:hlinkClick r:id="rId2"/>
+              </a:rPr>
+              <a:t>Copy problem001</a:t>
             </a:r>
             <a:r>
               <a:rPr lang="en-US" dirty="0" smtClean="0">
                 <a:hlinkClick r:id="rId2"/>
               </a:rPr>
-              <a:t>https://dl.dropboxusercontent.com/u/77362135/problem001.zip</a:t>
+              <a:t>.zip</a:t>
             </a:r>
             <a:endParaRPr lang="en-US" dirty="0" smtClean="0"/>
           </a:p>

</xml_diff>